<commit_message>
Presentation in Folder 0 updated
</commit_message>
<xml_diff>
--- a/Folder0/Presentation1.pptx
+++ b/Folder0/Presentation1.pptx
@@ -8,9 +8,17 @@
     <p:sldId id="256" r:id="rId2"/>
     <p:sldId id="257" r:id="rId3"/>
     <p:sldId id="261" r:id="rId4"/>
-    <p:sldId id="258" r:id="rId5"/>
-    <p:sldId id="259" r:id="rId6"/>
-    <p:sldId id="260" r:id="rId7"/>
+    <p:sldId id="262" r:id="rId5"/>
+    <p:sldId id="263" r:id="rId6"/>
+    <p:sldId id="264" r:id="rId7"/>
+    <p:sldId id="258" r:id="rId8"/>
+    <p:sldId id="269" r:id="rId9"/>
+    <p:sldId id="265" r:id="rId10"/>
+    <p:sldId id="266" r:id="rId11"/>
+    <p:sldId id="268" r:id="rId12"/>
+    <p:sldId id="267" r:id="rId13"/>
+    <p:sldId id="270" r:id="rId14"/>
+    <p:sldId id="260" r:id="rId15"/>
   </p:sldIdLst>
   <p:sldSz cx="12192000" cy="6858000"/>
   <p:notesSz cx="6858000" cy="9144000"/>
@@ -3394,6 +3402,650 @@
 </p:sld>
 </file>
 
+<file path=ppt/slides/slide10.xml><?xml version="1.0" encoding="utf-8"?>
+<p:sld xmlns:a="http://schemas.openxmlformats.org/drawingml/2006/main" xmlns:r="http://schemas.openxmlformats.org/officeDocument/2006/relationships" xmlns:p="http://schemas.openxmlformats.org/presentationml/2006/main">
+  <p:cSld>
+    <p:spTree>
+      <p:nvGrpSpPr>
+        <p:cNvPr id="1" name=""/>
+        <p:cNvGrpSpPr/>
+        <p:nvPr/>
+      </p:nvGrpSpPr>
+      <p:grpSpPr>
+        <a:xfrm>
+          <a:off x="0" y="0"/>
+          <a:ext cx="0" cy="0"/>
+          <a:chOff x="0" y="0"/>
+          <a:chExt cx="0" cy="0"/>
+        </a:xfrm>
+      </p:grpSpPr>
+      <p:sp>
+        <p:nvSpPr>
+          <p:cNvPr id="2" name="Title 1">
+            <a:extLst>
+              <a:ext uri="{FF2B5EF4-FFF2-40B4-BE49-F238E27FC236}">
+                <a16:creationId xmlns:a16="http://schemas.microsoft.com/office/drawing/2014/main" id="{88EEA56A-21EC-4C5D-9474-BFBF3B512795}"/>
+              </a:ext>
+            </a:extLst>
+          </p:cNvPr>
+          <p:cNvSpPr>
+            <a:spLocks noGrp="1"/>
+          </p:cNvSpPr>
+          <p:nvPr>
+            <p:ph type="title"/>
+          </p:nvPr>
+        </p:nvSpPr>
+        <p:spPr/>
+        <p:txBody>
+          <a:bodyPr/>
+          <a:lstStyle/>
+          <a:p>
+            <a:r>
+              <a:rPr lang="en-US" dirty="0"/>
+              <a:t>Preventative Measures [John]</a:t>
+            </a:r>
+            <a:br>
+              <a:rPr lang="en-US" dirty="0"/>
+            </a:br>
+            <a:r>
+              <a:rPr lang="en-US" sz="3200" dirty="0"/>
+              <a:t>High-level conclusion</a:t>
+            </a:r>
+            <a:endParaRPr lang="en-US" dirty="0"/>
+          </a:p>
+        </p:txBody>
+      </p:sp>
+      <p:sp>
+        <p:nvSpPr>
+          <p:cNvPr id="3" name="Content Placeholder 2">
+            <a:extLst>
+              <a:ext uri="{FF2B5EF4-FFF2-40B4-BE49-F238E27FC236}">
+                <a16:creationId xmlns:a16="http://schemas.microsoft.com/office/drawing/2014/main" id="{8255C409-34C6-40B3-BFB5-F40F2E36F4B8}"/>
+              </a:ext>
+            </a:extLst>
+          </p:cNvPr>
+          <p:cNvSpPr>
+            <a:spLocks noGrp="1"/>
+          </p:cNvSpPr>
+          <p:nvPr>
+            <p:ph idx="1"/>
+          </p:nvPr>
+        </p:nvSpPr>
+        <p:spPr/>
+        <p:txBody>
+          <a:bodyPr/>
+          <a:lstStyle/>
+          <a:p>
+            <a:r>
+              <a:rPr lang="en-US" dirty="0"/>
+              <a:t>2 histogram on same plot – death rate with mask and without mask</a:t>
+            </a:r>
+          </a:p>
+          <a:p>
+            <a:r>
+              <a:rPr lang="en-US" dirty="0"/>
+              <a:t>2 Sample t-test – is there a difference?</a:t>
+            </a:r>
+          </a:p>
+        </p:txBody>
+      </p:sp>
+      <p:sp>
+        <p:nvSpPr>
+          <p:cNvPr id="4" name="TextBox 3">
+            <a:extLst>
+              <a:ext uri="{FF2B5EF4-FFF2-40B4-BE49-F238E27FC236}">
+                <a16:creationId xmlns:a16="http://schemas.microsoft.com/office/drawing/2014/main" id="{AB8D94A0-A1DF-4026-97E3-EEA0267611A1}"/>
+              </a:ext>
+            </a:extLst>
+          </p:cNvPr>
+          <p:cNvSpPr txBox="1"/>
+          <p:nvPr/>
+        </p:nvSpPr>
+        <p:spPr>
+          <a:xfrm>
+            <a:off x="786384" y="5850235"/>
+            <a:ext cx="9589008" cy="830997"/>
+          </a:xfrm>
+          <a:prstGeom prst="rect">
+            <a:avLst/>
+          </a:prstGeom>
+          <a:noFill/>
+        </p:spPr>
+        <p:txBody>
+          <a:bodyPr wrap="square" rtlCol="0">
+            <a:spAutoFit/>
+          </a:bodyPr>
+          <a:lstStyle/>
+          <a:p>
+            <a:r>
+              <a:rPr lang="en-US" sz="1200" b="1" u="sng" dirty="0"/>
+              <a:t>The Small Print</a:t>
+            </a:r>
+          </a:p>
+          <a:p>
+            <a:r>
+              <a:rPr lang="en-US" sz="1200" dirty="0"/>
+              <a:t>Definitions of any terms or metrics:  March 2020 to April 2021 | Death Rate is cumulative confirmed Covid Deaths / cumulative confirmed Covid Cases </a:t>
+            </a:r>
+          </a:p>
+          <a:p>
+            <a:r>
+              <a:rPr lang="en-US" sz="1200" dirty="0"/>
+              <a:t>Data Sources: Center for Disease Control (CDC) website: cdc.gov</a:t>
+            </a:r>
+          </a:p>
+          <a:p>
+            <a:r>
+              <a:rPr lang="en-US" sz="1200" dirty="0"/>
+              <a:t>Omissions or filtering: No data for AS</a:t>
+            </a:r>
+          </a:p>
+        </p:txBody>
+      </p:sp>
+    </p:spTree>
+    <p:extLst>
+      <p:ext uri="{BB962C8B-B14F-4D97-AF65-F5344CB8AC3E}">
+        <p14:creationId xmlns:p14="http://schemas.microsoft.com/office/powerpoint/2010/main" val="4204894420"/>
+      </p:ext>
+    </p:extLst>
+  </p:cSld>
+  <p:clrMapOvr>
+    <a:masterClrMapping/>
+  </p:clrMapOvr>
+</p:sld>
+</file>
+
+<file path=ppt/slides/slide11.xml><?xml version="1.0" encoding="utf-8"?>
+<p:sld xmlns:a="http://schemas.openxmlformats.org/drawingml/2006/main" xmlns:r="http://schemas.openxmlformats.org/officeDocument/2006/relationships" xmlns:p="http://schemas.openxmlformats.org/presentationml/2006/main">
+  <p:cSld>
+    <p:spTree>
+      <p:nvGrpSpPr>
+        <p:cNvPr id="1" name=""/>
+        <p:cNvGrpSpPr/>
+        <p:nvPr/>
+      </p:nvGrpSpPr>
+      <p:grpSpPr>
+        <a:xfrm>
+          <a:off x="0" y="0"/>
+          <a:ext cx="0" cy="0"/>
+          <a:chOff x="0" y="0"/>
+          <a:chExt cx="0" cy="0"/>
+        </a:xfrm>
+      </p:grpSpPr>
+      <p:sp>
+        <p:nvSpPr>
+          <p:cNvPr id="2" name="Title 1">
+            <a:extLst>
+              <a:ext uri="{FF2B5EF4-FFF2-40B4-BE49-F238E27FC236}">
+                <a16:creationId xmlns:a16="http://schemas.microsoft.com/office/drawing/2014/main" id="{88EEA56A-21EC-4C5D-9474-BFBF3B512795}"/>
+              </a:ext>
+            </a:extLst>
+          </p:cNvPr>
+          <p:cNvSpPr>
+            <a:spLocks noGrp="1"/>
+          </p:cNvSpPr>
+          <p:nvPr>
+            <p:ph type="title"/>
+          </p:nvPr>
+        </p:nvSpPr>
+        <p:spPr/>
+        <p:txBody>
+          <a:bodyPr/>
+          <a:lstStyle/>
+          <a:p>
+            <a:r>
+              <a:rPr lang="en-US" dirty="0"/>
+              <a:t>Vaccination Rollout [?]</a:t>
+            </a:r>
+            <a:br>
+              <a:rPr lang="en-US" dirty="0"/>
+            </a:br>
+            <a:r>
+              <a:rPr lang="en-US" sz="3200" dirty="0"/>
+              <a:t>High-level conclusion</a:t>
+            </a:r>
+            <a:endParaRPr lang="en-US" dirty="0"/>
+          </a:p>
+        </p:txBody>
+      </p:sp>
+      <p:sp>
+        <p:nvSpPr>
+          <p:cNvPr id="3" name="Content Placeholder 2">
+            <a:extLst>
+              <a:ext uri="{FF2B5EF4-FFF2-40B4-BE49-F238E27FC236}">
+                <a16:creationId xmlns:a16="http://schemas.microsoft.com/office/drawing/2014/main" id="{8255C409-34C6-40B3-BFB5-F40F2E36F4B8}"/>
+              </a:ext>
+            </a:extLst>
+          </p:cNvPr>
+          <p:cNvSpPr>
+            <a:spLocks noGrp="1"/>
+          </p:cNvSpPr>
+          <p:nvPr>
+            <p:ph idx="1"/>
+          </p:nvPr>
+        </p:nvSpPr>
+        <p:spPr/>
+        <p:txBody>
+          <a:bodyPr/>
+          <a:lstStyle/>
+          <a:p>
+            <a:r>
+              <a:rPr lang="en-US" dirty="0"/>
+              <a:t>Scatter % complete versus death rate</a:t>
+            </a:r>
+          </a:p>
+          <a:p>
+            <a:r>
+              <a:rPr lang="en-US" dirty="0"/>
+              <a:t>Regression</a:t>
+            </a:r>
+          </a:p>
+        </p:txBody>
+      </p:sp>
+      <p:sp>
+        <p:nvSpPr>
+          <p:cNvPr id="4" name="TextBox 3">
+            <a:extLst>
+              <a:ext uri="{FF2B5EF4-FFF2-40B4-BE49-F238E27FC236}">
+                <a16:creationId xmlns:a16="http://schemas.microsoft.com/office/drawing/2014/main" id="{AB8D94A0-A1DF-4026-97E3-EEA0267611A1}"/>
+              </a:ext>
+            </a:extLst>
+          </p:cNvPr>
+          <p:cNvSpPr txBox="1"/>
+          <p:nvPr/>
+        </p:nvSpPr>
+        <p:spPr>
+          <a:xfrm>
+            <a:off x="786384" y="5850235"/>
+            <a:ext cx="9589008" cy="830997"/>
+          </a:xfrm>
+          <a:prstGeom prst="rect">
+            <a:avLst/>
+          </a:prstGeom>
+          <a:noFill/>
+        </p:spPr>
+        <p:txBody>
+          <a:bodyPr wrap="square" rtlCol="0">
+            <a:spAutoFit/>
+          </a:bodyPr>
+          <a:lstStyle/>
+          <a:p>
+            <a:r>
+              <a:rPr lang="en-US" sz="1200" b="1" u="sng" dirty="0"/>
+              <a:t>The Small Print</a:t>
+            </a:r>
+          </a:p>
+          <a:p>
+            <a:r>
+              <a:rPr lang="en-US" sz="1200" dirty="0"/>
+              <a:t>Definitions of any terms or metrics:  March 2020 to April 2021 | Death Rate is cumulative confirmed Covid Deaths / cumulative confirmed Covid Cases </a:t>
+            </a:r>
+          </a:p>
+          <a:p>
+            <a:r>
+              <a:rPr lang="en-US" sz="1200" dirty="0"/>
+              <a:t>Data Sources: Center for Disease Control (CDC) website: cdc.gov</a:t>
+            </a:r>
+          </a:p>
+          <a:p>
+            <a:r>
+              <a:rPr lang="en-US" sz="1200" dirty="0"/>
+              <a:t>Omissions or filtering: No data for AS</a:t>
+            </a:r>
+          </a:p>
+        </p:txBody>
+      </p:sp>
+    </p:spTree>
+    <p:extLst>
+      <p:ext uri="{BB962C8B-B14F-4D97-AF65-F5344CB8AC3E}">
+        <p14:creationId xmlns:p14="http://schemas.microsoft.com/office/powerpoint/2010/main" val="2518426682"/>
+      </p:ext>
+    </p:extLst>
+  </p:cSld>
+  <p:clrMapOvr>
+    <a:masterClrMapping/>
+  </p:clrMapOvr>
+</p:sld>
+</file>
+
+<file path=ppt/slides/slide12.xml><?xml version="1.0" encoding="utf-8"?>
+<p:sld xmlns:a="http://schemas.openxmlformats.org/drawingml/2006/main" xmlns:r="http://schemas.openxmlformats.org/officeDocument/2006/relationships" xmlns:p="http://schemas.openxmlformats.org/presentationml/2006/main">
+  <p:cSld>
+    <p:spTree>
+      <p:nvGrpSpPr>
+        <p:cNvPr id="1" name=""/>
+        <p:cNvGrpSpPr/>
+        <p:nvPr/>
+      </p:nvGrpSpPr>
+      <p:grpSpPr>
+        <a:xfrm>
+          <a:off x="0" y="0"/>
+          <a:ext cx="0" cy="0"/>
+          <a:chOff x="0" y="0"/>
+          <a:chExt cx="0" cy="0"/>
+        </a:xfrm>
+      </p:grpSpPr>
+      <p:sp>
+        <p:nvSpPr>
+          <p:cNvPr id="2" name="Title 1">
+            <a:extLst>
+              <a:ext uri="{FF2B5EF4-FFF2-40B4-BE49-F238E27FC236}">
+                <a16:creationId xmlns:a16="http://schemas.microsoft.com/office/drawing/2014/main" id="{88EEA56A-21EC-4C5D-9474-BFBF3B512795}"/>
+              </a:ext>
+            </a:extLst>
+          </p:cNvPr>
+          <p:cNvSpPr>
+            <a:spLocks noGrp="1"/>
+          </p:cNvSpPr>
+          <p:nvPr>
+            <p:ph type="title"/>
+          </p:nvPr>
+        </p:nvSpPr>
+        <p:spPr/>
+        <p:txBody>
+          <a:bodyPr/>
+          <a:lstStyle/>
+          <a:p>
+            <a:r>
+              <a:rPr lang="en-US" dirty="0"/>
+              <a:t>Demographics [?]</a:t>
+            </a:r>
+            <a:br>
+              <a:rPr lang="en-US" dirty="0"/>
+            </a:br>
+            <a:r>
+              <a:rPr lang="en-US" sz="3200" dirty="0"/>
+              <a:t>High-level conclusion</a:t>
+            </a:r>
+            <a:endParaRPr lang="en-US" dirty="0"/>
+          </a:p>
+        </p:txBody>
+      </p:sp>
+      <p:sp>
+        <p:nvSpPr>
+          <p:cNvPr id="3" name="Content Placeholder 2">
+            <a:extLst>
+              <a:ext uri="{FF2B5EF4-FFF2-40B4-BE49-F238E27FC236}">
+                <a16:creationId xmlns:a16="http://schemas.microsoft.com/office/drawing/2014/main" id="{8255C409-34C6-40B3-BFB5-F40F2E36F4B8}"/>
+              </a:ext>
+            </a:extLst>
+          </p:cNvPr>
+          <p:cNvSpPr>
+            <a:spLocks noGrp="1"/>
+          </p:cNvSpPr>
+          <p:nvPr>
+            <p:ph idx="1"/>
+          </p:nvPr>
+        </p:nvSpPr>
+        <p:spPr/>
+        <p:txBody>
+          <a:bodyPr/>
+          <a:lstStyle/>
+          <a:p>
+            <a:r>
+              <a:rPr lang="en-US" dirty="0"/>
+              <a:t>Chart</a:t>
+            </a:r>
+          </a:p>
+        </p:txBody>
+      </p:sp>
+      <p:sp>
+        <p:nvSpPr>
+          <p:cNvPr id="4" name="TextBox 3">
+            <a:extLst>
+              <a:ext uri="{FF2B5EF4-FFF2-40B4-BE49-F238E27FC236}">
+                <a16:creationId xmlns:a16="http://schemas.microsoft.com/office/drawing/2014/main" id="{AB8D94A0-A1DF-4026-97E3-EEA0267611A1}"/>
+              </a:ext>
+            </a:extLst>
+          </p:cNvPr>
+          <p:cNvSpPr txBox="1"/>
+          <p:nvPr/>
+        </p:nvSpPr>
+        <p:spPr>
+          <a:xfrm>
+            <a:off x="786384" y="5850235"/>
+            <a:ext cx="9589008" cy="830997"/>
+          </a:xfrm>
+          <a:prstGeom prst="rect">
+            <a:avLst/>
+          </a:prstGeom>
+          <a:noFill/>
+        </p:spPr>
+        <p:txBody>
+          <a:bodyPr wrap="square" rtlCol="0">
+            <a:spAutoFit/>
+          </a:bodyPr>
+          <a:lstStyle/>
+          <a:p>
+            <a:r>
+              <a:rPr lang="en-US" sz="1200" b="1" u="sng" dirty="0"/>
+              <a:t>The Small Print</a:t>
+            </a:r>
+          </a:p>
+          <a:p>
+            <a:r>
+              <a:rPr lang="en-US" sz="1200" dirty="0"/>
+              <a:t>Definitions of any terms or metrics:  March 2020 to April 2021 | Death Rate is cumulative confirmed Covid Deaths / cumulative confirmed Covid Cases </a:t>
+            </a:r>
+          </a:p>
+          <a:p>
+            <a:r>
+              <a:rPr lang="en-US" sz="1200" dirty="0"/>
+              <a:t>Data Sources: Center for Disease Control (CDC) website: cdc.gov</a:t>
+            </a:r>
+          </a:p>
+          <a:p>
+            <a:r>
+              <a:rPr lang="en-US" sz="1200" dirty="0"/>
+              <a:t>Omissions or filtering: No data for AS</a:t>
+            </a:r>
+          </a:p>
+        </p:txBody>
+      </p:sp>
+    </p:spTree>
+    <p:extLst>
+      <p:ext uri="{BB962C8B-B14F-4D97-AF65-F5344CB8AC3E}">
+        <p14:creationId xmlns:p14="http://schemas.microsoft.com/office/powerpoint/2010/main" val="232561670"/>
+      </p:ext>
+    </p:extLst>
+  </p:cSld>
+  <p:clrMapOvr>
+    <a:masterClrMapping/>
+  </p:clrMapOvr>
+</p:sld>
+</file>
+
+<file path=ppt/slides/slide13.xml><?xml version="1.0" encoding="utf-8"?>
+<p:sld xmlns:a="http://schemas.openxmlformats.org/drawingml/2006/main" xmlns:r="http://schemas.openxmlformats.org/officeDocument/2006/relationships" xmlns:p="http://schemas.openxmlformats.org/presentationml/2006/main">
+  <p:cSld>
+    <p:spTree>
+      <p:nvGrpSpPr>
+        <p:cNvPr id="1" name=""/>
+        <p:cNvGrpSpPr/>
+        <p:nvPr/>
+      </p:nvGrpSpPr>
+      <p:grpSpPr>
+        <a:xfrm>
+          <a:off x="0" y="0"/>
+          <a:ext cx="0" cy="0"/>
+          <a:chOff x="0" y="0"/>
+          <a:chExt cx="0" cy="0"/>
+        </a:xfrm>
+      </p:grpSpPr>
+      <p:sp>
+        <p:nvSpPr>
+          <p:cNvPr id="2" name="Title 1">
+            <a:extLst>
+              <a:ext uri="{FF2B5EF4-FFF2-40B4-BE49-F238E27FC236}">
+                <a16:creationId xmlns:a16="http://schemas.microsoft.com/office/drawing/2014/main" id="{AE77BA51-5CA8-47D3-BBDF-9027CDFCCFBB}"/>
+              </a:ext>
+            </a:extLst>
+          </p:cNvPr>
+          <p:cNvSpPr>
+            <a:spLocks noGrp="1"/>
+          </p:cNvSpPr>
+          <p:nvPr>
+            <p:ph type="title"/>
+          </p:nvPr>
+        </p:nvSpPr>
+        <p:spPr/>
+        <p:txBody>
+          <a:bodyPr/>
+          <a:lstStyle/>
+          <a:p>
+            <a:r>
+              <a:rPr lang="en-US" dirty="0"/>
+              <a:t>Overall Conclusions [All]</a:t>
+            </a:r>
+          </a:p>
+        </p:txBody>
+      </p:sp>
+      <p:sp>
+        <p:nvSpPr>
+          <p:cNvPr id="3" name="Content Placeholder 2">
+            <a:extLst>
+              <a:ext uri="{FF2B5EF4-FFF2-40B4-BE49-F238E27FC236}">
+                <a16:creationId xmlns:a16="http://schemas.microsoft.com/office/drawing/2014/main" id="{1EF89807-BD61-448C-AECF-F0035C097D51}"/>
+              </a:ext>
+            </a:extLst>
+          </p:cNvPr>
+          <p:cNvSpPr>
+            <a:spLocks noGrp="1"/>
+          </p:cNvSpPr>
+          <p:nvPr>
+            <p:ph idx="1"/>
+          </p:nvPr>
+        </p:nvSpPr>
+        <p:spPr/>
+        <p:txBody>
+          <a:bodyPr/>
+          <a:lstStyle/>
+          <a:p>
+            <a:r>
+              <a:rPr lang="en-US" dirty="0"/>
+              <a:t>Summary</a:t>
+            </a:r>
+          </a:p>
+          <a:p>
+            <a:r>
+              <a:rPr lang="en-US" dirty="0"/>
+              <a:t>Lessons learned</a:t>
+            </a:r>
+          </a:p>
+        </p:txBody>
+      </p:sp>
+    </p:spTree>
+    <p:extLst>
+      <p:ext uri="{BB962C8B-B14F-4D97-AF65-F5344CB8AC3E}">
+        <p14:creationId xmlns:p14="http://schemas.microsoft.com/office/powerpoint/2010/main" val="2904545767"/>
+      </p:ext>
+    </p:extLst>
+  </p:cSld>
+  <p:clrMapOvr>
+    <a:masterClrMapping/>
+  </p:clrMapOvr>
+</p:sld>
+</file>
+
+<file path=ppt/slides/slide14.xml><?xml version="1.0" encoding="utf-8"?>
+<p:sld xmlns:a="http://schemas.openxmlformats.org/drawingml/2006/main" xmlns:r="http://schemas.openxmlformats.org/officeDocument/2006/relationships" xmlns:p="http://schemas.openxmlformats.org/presentationml/2006/main">
+  <p:cSld>
+    <p:spTree>
+      <p:nvGrpSpPr>
+        <p:cNvPr id="1" name=""/>
+        <p:cNvGrpSpPr/>
+        <p:nvPr/>
+      </p:nvGrpSpPr>
+      <p:grpSpPr>
+        <a:xfrm>
+          <a:off x="0" y="0"/>
+          <a:ext cx="0" cy="0"/>
+          <a:chOff x="0" y="0"/>
+          <a:chExt cx="0" cy="0"/>
+        </a:xfrm>
+      </p:grpSpPr>
+      <p:sp>
+        <p:nvSpPr>
+          <p:cNvPr id="2" name="Title 1">
+            <a:extLst>
+              <a:ext uri="{FF2B5EF4-FFF2-40B4-BE49-F238E27FC236}">
+                <a16:creationId xmlns:a16="http://schemas.microsoft.com/office/drawing/2014/main" id="{138B9383-E7C7-4DD9-B148-EE11B299E860}"/>
+              </a:ext>
+            </a:extLst>
+          </p:cNvPr>
+          <p:cNvSpPr>
+            <a:spLocks noGrp="1"/>
+          </p:cNvSpPr>
+          <p:nvPr>
+            <p:ph type="title"/>
+          </p:nvPr>
+        </p:nvSpPr>
+        <p:spPr/>
+        <p:txBody>
+          <a:bodyPr/>
+          <a:lstStyle/>
+          <a:p>
+            <a:r>
+              <a:rPr lang="en-US" dirty="0" err="1"/>
+              <a:t>DataFrames</a:t>
+            </a:r>
+            <a:endParaRPr lang="en-US" dirty="0"/>
+          </a:p>
+        </p:txBody>
+      </p:sp>
+      <p:sp>
+        <p:nvSpPr>
+          <p:cNvPr id="3" name="Content Placeholder 2">
+            <a:extLst>
+              <a:ext uri="{FF2B5EF4-FFF2-40B4-BE49-F238E27FC236}">
+                <a16:creationId xmlns:a16="http://schemas.microsoft.com/office/drawing/2014/main" id="{5C2E37D8-100C-44EC-8EF6-2A74500F739A}"/>
+              </a:ext>
+            </a:extLst>
+          </p:cNvPr>
+          <p:cNvSpPr>
+            <a:spLocks noGrp="1"/>
+          </p:cNvSpPr>
+          <p:nvPr>
+            <p:ph idx="1"/>
+          </p:nvPr>
+        </p:nvSpPr>
+        <p:spPr/>
+        <p:txBody>
+          <a:bodyPr/>
+          <a:lstStyle/>
+          <a:p>
+            <a:r>
+              <a:rPr lang="en-US" dirty="0"/>
+              <a:t>Monthly</a:t>
+            </a:r>
+          </a:p>
+          <a:p>
+            <a:r>
+              <a:rPr lang="en-US" dirty="0"/>
+              <a:t>Weekly</a:t>
+            </a:r>
+          </a:p>
+          <a:p>
+            <a:r>
+              <a:rPr lang="en-US" dirty="0"/>
+              <a:t>Not time bound</a:t>
+            </a:r>
+          </a:p>
+        </p:txBody>
+      </p:sp>
+    </p:spTree>
+    <p:extLst>
+      <p:ext uri="{BB962C8B-B14F-4D97-AF65-F5344CB8AC3E}">
+        <p14:creationId xmlns:p14="http://schemas.microsoft.com/office/powerpoint/2010/main" val="1899077523"/>
+      </p:ext>
+    </p:extLst>
+  </p:cSld>
+  <p:clrMapOvr>
+    <a:masterClrMapping/>
+  </p:clrMapOvr>
+</p:sld>
+</file>
+
 <file path=ppt/slides/slide2.xml><?xml version="1.0" encoding="utf-8"?>
 <p:sld xmlns:a="http://schemas.openxmlformats.org/drawingml/2006/main" xmlns:r="http://schemas.openxmlformats.org/officeDocument/2006/relationships" xmlns:p="http://schemas.openxmlformats.org/presentationml/2006/main">
   <p:cSld>
@@ -3599,7 +4251,18 @@
           <a:bodyPr/>
           <a:lstStyle/>
           <a:p>
-            <a:endParaRPr lang="en-US"/>
+            <a:r>
+              <a:rPr lang="en-US" dirty="0"/>
+              <a:t>Death Rate by State [Pallavi]</a:t>
+            </a:r>
+            <a:br>
+              <a:rPr lang="en-US" dirty="0"/>
+            </a:br>
+            <a:r>
+              <a:rPr lang="en-US" sz="3200" dirty="0"/>
+              <a:t>High-level conclusion</a:t>
+            </a:r>
+            <a:endParaRPr lang="en-US" dirty="0"/>
           </a:p>
         </p:txBody>
       </p:sp>
@@ -3624,10 +4287,102 @@
           <a:bodyPr/>
           <a:lstStyle/>
           <a:p>
-            <a:endParaRPr lang="en-US"/>
-          </a:p>
-        </p:txBody>
-      </p:sp>
+            <a:r>
+              <a:rPr lang="en-US" dirty="0"/>
+              <a:t>Bar Chart – death rate versus state</a:t>
+            </a:r>
+          </a:p>
+          <a:p>
+            <a:r>
+              <a:rPr lang="en-US" dirty="0"/>
+              <a:t>Box Plot - outliers</a:t>
+            </a:r>
+          </a:p>
+        </p:txBody>
+      </p:sp>
+      <p:sp>
+        <p:nvSpPr>
+          <p:cNvPr id="4" name="TextBox 3">
+            <a:extLst>
+              <a:ext uri="{FF2B5EF4-FFF2-40B4-BE49-F238E27FC236}">
+                <a16:creationId xmlns:a16="http://schemas.microsoft.com/office/drawing/2014/main" id="{AB8D94A0-A1DF-4026-97E3-EEA0267611A1}"/>
+              </a:ext>
+            </a:extLst>
+          </p:cNvPr>
+          <p:cNvSpPr txBox="1"/>
+          <p:nvPr/>
+        </p:nvSpPr>
+        <p:spPr>
+          <a:xfrm>
+            <a:off x="786384" y="5850235"/>
+            <a:ext cx="9589008" cy="830997"/>
+          </a:xfrm>
+          <a:prstGeom prst="rect">
+            <a:avLst/>
+          </a:prstGeom>
+          <a:noFill/>
+        </p:spPr>
+        <p:txBody>
+          <a:bodyPr wrap="square" rtlCol="0">
+            <a:spAutoFit/>
+          </a:bodyPr>
+          <a:lstStyle/>
+          <a:p>
+            <a:r>
+              <a:rPr lang="en-US" sz="1200" b="1" u="sng" dirty="0"/>
+              <a:t>The Small Print</a:t>
+            </a:r>
+          </a:p>
+          <a:p>
+            <a:r>
+              <a:rPr lang="en-US" sz="1200" dirty="0"/>
+              <a:t>Definitions of any terms or metrics:  March 2020 to April 2021 | Death Rate is cumulative confirmed Covid Deaths / cumulative confirmed Covid Cases </a:t>
+            </a:r>
+          </a:p>
+          <a:p>
+            <a:r>
+              <a:rPr lang="en-US" sz="1200" dirty="0"/>
+              <a:t>Data Sources: Center for Disease Control (CDC) website: cdc.gov</a:t>
+            </a:r>
+          </a:p>
+          <a:p>
+            <a:r>
+              <a:rPr lang="en-US" sz="1200" dirty="0"/>
+              <a:t>Omissions or filtering: No data for AS</a:t>
+            </a:r>
+          </a:p>
+        </p:txBody>
+      </p:sp>
+      <p:pic>
+        <p:nvPicPr>
+          <p:cNvPr id="6" name="Picture 5">
+            <a:extLst>
+              <a:ext uri="{FF2B5EF4-FFF2-40B4-BE49-F238E27FC236}">
+                <a16:creationId xmlns:a16="http://schemas.microsoft.com/office/drawing/2014/main" id="{5870906F-6366-4FBA-AEB0-88F7FB3B87CA}"/>
+              </a:ext>
+            </a:extLst>
+          </p:cNvPr>
+          <p:cNvPicPr>
+            <a:picLocks noChangeAspect="1"/>
+          </p:cNvPicPr>
+          <p:nvPr/>
+        </p:nvPicPr>
+        <p:blipFill>
+          <a:blip r:embed="rId2"/>
+          <a:stretch>
+            <a:fillRect/>
+          </a:stretch>
+        </p:blipFill>
+        <p:spPr>
+          <a:xfrm>
+            <a:off x="838200" y="1690688"/>
+            <a:ext cx="5445541" cy="3889673"/>
+          </a:xfrm>
+          <a:prstGeom prst="rect">
+            <a:avLst/>
+          </a:prstGeom>
+        </p:spPr>
+      </p:pic>
     </p:spTree>
     <p:extLst>
       <p:ext uri="{BB962C8B-B14F-4D97-AF65-F5344CB8AC3E}">
@@ -3663,7 +4418,7 @@
           <p:cNvPr id="2" name="Title 1">
             <a:extLst>
               <a:ext uri="{FF2B5EF4-FFF2-40B4-BE49-F238E27FC236}">
-                <a16:creationId xmlns:a16="http://schemas.microsoft.com/office/drawing/2014/main" id="{3F26E01B-F803-4DC7-95D3-9844DB734770}"/>
+                <a16:creationId xmlns:a16="http://schemas.microsoft.com/office/drawing/2014/main" id="{88EEA56A-21EC-4C5D-9474-BFBF3B512795}"/>
               </a:ext>
             </a:extLst>
           </p:cNvPr>
@@ -3676,13 +4431,23 @@
         </p:nvSpPr>
         <p:spPr/>
         <p:txBody>
-          <a:bodyPr/>
-          <a:lstStyle/>
-          <a:p>
-            <a:r>
-              <a:rPr lang="en-US" dirty="0"/>
-              <a:t>Mitigating / Explanations</a:t>
-            </a:r>
+          <a:bodyPr>
+            <a:normAutofit/>
+          </a:bodyPr>
+          <a:lstStyle/>
+          <a:p>
+            <a:r>
+              <a:rPr lang="en-US" dirty="0"/>
+              <a:t>Death Rate normalized by age [Jennie]</a:t>
+            </a:r>
+            <a:br>
+              <a:rPr lang="en-US" dirty="0"/>
+            </a:br>
+            <a:r>
+              <a:rPr lang="en-US" sz="3200" dirty="0"/>
+              <a:t>High-level conclusion</a:t>
+            </a:r>
+            <a:endParaRPr lang="en-US" dirty="0"/>
           </a:p>
         </p:txBody>
       </p:sp>
@@ -3691,7 +4456,7 @@
           <p:cNvPr id="3" name="Content Placeholder 2">
             <a:extLst>
               <a:ext uri="{FF2B5EF4-FFF2-40B4-BE49-F238E27FC236}">
-                <a16:creationId xmlns:a16="http://schemas.microsoft.com/office/drawing/2014/main" id="{B839295A-742B-48D5-BF10-2EEC2FE791B0}"/>
+                <a16:creationId xmlns:a16="http://schemas.microsoft.com/office/drawing/2014/main" id="{8255C409-34C6-40B3-BFB5-F40F2E36F4B8}"/>
               </a:ext>
             </a:extLst>
           </p:cNvPr>
@@ -3709,59 +4474,66 @@
           <a:p>
             <a:r>
               <a:rPr lang="en-US" dirty="0"/>
-              <a:t>Health</a:t>
-            </a:r>
-          </a:p>
-          <a:p>
-            <a:pPr lvl="1"/>
-            <a:r>
-              <a:rPr lang="en-US" dirty="0"/>
-              <a:t>Quality of health care =&gt; hospital beds per capita</a:t>
-            </a:r>
-          </a:p>
-          <a:p>
-            <a:pPr lvl="1"/>
-            <a:r>
-              <a:rPr lang="en-US" dirty="0"/>
-              <a:t>Scatter plot normalized death rate versus hospital beds</a:t>
-            </a:r>
-          </a:p>
-          <a:p>
-            <a:pPr lvl="1"/>
-            <a:r>
-              <a:rPr lang="en-US" dirty="0"/>
-              <a:t>Regression analysis</a:t>
-            </a:r>
-          </a:p>
-          <a:p>
-            <a:pPr lvl="1"/>
-            <a:endParaRPr lang="en-US" dirty="0"/>
-          </a:p>
-          <a:p>
-            <a:r>
-              <a:rPr lang="en-US" dirty="0"/>
-              <a:t>Preventative Measures</a:t>
-            </a:r>
-          </a:p>
-          <a:p>
-            <a:pPr lvl="1"/>
-            <a:r>
-              <a:rPr lang="en-US" dirty="0"/>
-              <a:t>Mask mandate data (by month)</a:t>
-            </a:r>
-          </a:p>
-          <a:p>
-            <a:pPr lvl="1"/>
-            <a:r>
-              <a:rPr lang="en-US" dirty="0"/>
-              <a:t>Yes or no</a:t>
-            </a:r>
-          </a:p>
-          <a:p>
-            <a:pPr lvl="1"/>
-            <a:r>
-              <a:rPr lang="en-US" dirty="0"/>
-              <a:t>2-sample t-test</a:t>
+              <a:t>Bar Chart – % deaths by age / % population by age</a:t>
+            </a:r>
+          </a:p>
+          <a:p>
+            <a:r>
+              <a:rPr lang="en-US" dirty="0"/>
+              <a:t>Bar Chart – normalized death rate by age group</a:t>
+            </a:r>
+          </a:p>
+        </p:txBody>
+      </p:sp>
+      <p:sp>
+        <p:nvSpPr>
+          <p:cNvPr id="4" name="TextBox 3">
+            <a:extLst>
+              <a:ext uri="{FF2B5EF4-FFF2-40B4-BE49-F238E27FC236}">
+                <a16:creationId xmlns:a16="http://schemas.microsoft.com/office/drawing/2014/main" id="{AB8D94A0-A1DF-4026-97E3-EEA0267611A1}"/>
+              </a:ext>
+            </a:extLst>
+          </p:cNvPr>
+          <p:cNvSpPr txBox="1"/>
+          <p:nvPr/>
+        </p:nvSpPr>
+        <p:spPr>
+          <a:xfrm>
+            <a:off x="786384" y="5850235"/>
+            <a:ext cx="9589008" cy="830997"/>
+          </a:xfrm>
+          <a:prstGeom prst="rect">
+            <a:avLst/>
+          </a:prstGeom>
+          <a:noFill/>
+        </p:spPr>
+        <p:txBody>
+          <a:bodyPr wrap="square" rtlCol="0">
+            <a:spAutoFit/>
+          </a:bodyPr>
+          <a:lstStyle/>
+          <a:p>
+            <a:r>
+              <a:rPr lang="en-US" sz="1200" b="1" u="sng" dirty="0"/>
+              <a:t>The Small Print</a:t>
+            </a:r>
+          </a:p>
+          <a:p>
+            <a:r>
+              <a:rPr lang="en-US" sz="1200" dirty="0"/>
+              <a:t>Definitions of any terms or metrics:  March 2020 to April 2021 | Death Rate is cumulative confirmed Covid Deaths / cumulative confirmed Covid Cases </a:t>
+            </a:r>
+          </a:p>
+          <a:p>
+            <a:r>
+              <a:rPr lang="en-US" sz="1200" dirty="0"/>
+              <a:t>Data Sources: Center for Disease Control (CDC) website: cdc.gov</a:t>
+            </a:r>
+          </a:p>
+          <a:p>
+            <a:r>
+              <a:rPr lang="en-US" sz="1200" dirty="0"/>
+              <a:t>Omissions or filtering: No data for AS</a:t>
             </a:r>
           </a:p>
         </p:txBody>
@@ -3769,7 +4541,7 @@
     </p:spTree>
     <p:extLst>
       <p:ext uri="{BB962C8B-B14F-4D97-AF65-F5344CB8AC3E}">
-        <p14:creationId xmlns:p14="http://schemas.microsoft.com/office/powerpoint/2010/main" val="3984935855"/>
+        <p14:creationId xmlns:p14="http://schemas.microsoft.com/office/powerpoint/2010/main" val="3649761248"/>
       </p:ext>
     </p:extLst>
   </p:cSld>
@@ -3801,7 +4573,7 @@
           <p:cNvPr id="2" name="Title 1">
             <a:extLst>
               <a:ext uri="{FF2B5EF4-FFF2-40B4-BE49-F238E27FC236}">
-                <a16:creationId xmlns:a16="http://schemas.microsoft.com/office/drawing/2014/main" id="{DD2BE12E-2C71-4FC3-A715-6EA7AEBF1F6F}"/>
+                <a16:creationId xmlns:a16="http://schemas.microsoft.com/office/drawing/2014/main" id="{88EEA56A-21EC-4C5D-9474-BFBF3B512795}"/>
               </a:ext>
             </a:extLst>
           </p:cNvPr>
@@ -3819,8 +4591,16 @@
           <a:p>
             <a:r>
               <a:rPr lang="en-US" dirty="0"/>
-              <a:t>Mitigating / Explanations</a:t>
-            </a:r>
+              <a:t>Excess Deaths [John]</a:t>
+            </a:r>
+            <a:br>
+              <a:rPr lang="en-US" dirty="0"/>
+            </a:br>
+            <a:r>
+              <a:rPr lang="en-US" sz="3200" dirty="0"/>
+              <a:t>Q: Are all states reporting consistently?</a:t>
+            </a:r>
+            <a:endParaRPr lang="en-US" dirty="0"/>
           </a:p>
         </p:txBody>
       </p:sp>
@@ -3829,7 +4609,7 @@
           <p:cNvPr id="3" name="Content Placeholder 2">
             <a:extLst>
               <a:ext uri="{FF2B5EF4-FFF2-40B4-BE49-F238E27FC236}">
-                <a16:creationId xmlns:a16="http://schemas.microsoft.com/office/drawing/2014/main" id="{7F6B4214-1624-4766-8D3F-611B88207B9D}"/>
+                <a16:creationId xmlns:a16="http://schemas.microsoft.com/office/drawing/2014/main" id="{8255C409-34C6-40B3-BFB5-F40F2E36F4B8}"/>
               </a:ext>
             </a:extLst>
           </p:cNvPr>
@@ -3847,74 +4627,82 @@
           <a:p>
             <a:r>
               <a:rPr lang="en-US" dirty="0"/>
-              <a:t>Demographics (Scatter Plot – regression)</a:t>
-            </a:r>
-          </a:p>
-          <a:p>
-            <a:pPr lvl="1"/>
-            <a:r>
-              <a:rPr lang="en-US" dirty="0"/>
-              <a:t>Sex</a:t>
-            </a:r>
-          </a:p>
-          <a:p>
-            <a:pPr lvl="1"/>
-            <a:r>
-              <a:rPr lang="en-US" dirty="0"/>
-              <a:t>Race</a:t>
-            </a:r>
-          </a:p>
-          <a:p>
-            <a:pPr lvl="1"/>
-            <a:r>
-              <a:rPr lang="en-US" dirty="0"/>
-              <a:t>Income (if we have time)</a:t>
-            </a:r>
-          </a:p>
-          <a:p>
-            <a:pPr lvl="1"/>
-            <a:endParaRPr lang="en-US" dirty="0"/>
-          </a:p>
-          <a:p>
-            <a:r>
-              <a:rPr lang="en-US" dirty="0"/>
-              <a:t>Timing</a:t>
-            </a:r>
-          </a:p>
-          <a:p>
-            <a:pPr lvl="1"/>
-            <a:r>
-              <a:rPr lang="en-US" dirty="0"/>
-              <a:t>Vaccination roll out</a:t>
-            </a:r>
-          </a:p>
-          <a:p>
-            <a:pPr lvl="1"/>
-            <a:endParaRPr lang="en-US" dirty="0"/>
-          </a:p>
-          <a:p>
-            <a:r>
-              <a:rPr lang="en-US" dirty="0"/>
-              <a:t>Geography</a:t>
-            </a:r>
-          </a:p>
-          <a:p>
-            <a:pPr lvl="1"/>
-            <a:r>
-              <a:rPr lang="en-US" dirty="0"/>
-              <a:t>Urban/Metropolitan populations (if we have time)</a:t>
-            </a:r>
-          </a:p>
-          <a:p>
-            <a:pPr lvl="1"/>
-            <a:endParaRPr lang="en-US" dirty="0"/>
+              <a:t>Explanation – Covid deaths by Week / Excess Deaths by Week (USA)</a:t>
+            </a:r>
+          </a:p>
+          <a:p>
+            <a:r>
+              <a:rPr lang="en-US" dirty="0"/>
+              <a:t>Max % difference between </a:t>
+            </a:r>
+            <a:r>
+              <a:rPr lang="en-US" dirty="0" err="1"/>
+              <a:t>Coivd</a:t>
+            </a:r>
+            <a:r>
+              <a:rPr lang="en-US" dirty="0"/>
+              <a:t> and Excess Deaths</a:t>
+            </a:r>
+          </a:p>
+        </p:txBody>
+      </p:sp>
+      <p:sp>
+        <p:nvSpPr>
+          <p:cNvPr id="4" name="TextBox 3">
+            <a:extLst>
+              <a:ext uri="{FF2B5EF4-FFF2-40B4-BE49-F238E27FC236}">
+                <a16:creationId xmlns:a16="http://schemas.microsoft.com/office/drawing/2014/main" id="{AB8D94A0-A1DF-4026-97E3-EEA0267611A1}"/>
+              </a:ext>
+            </a:extLst>
+          </p:cNvPr>
+          <p:cNvSpPr txBox="1"/>
+          <p:nvPr/>
+        </p:nvSpPr>
+        <p:spPr>
+          <a:xfrm>
+            <a:off x="786384" y="5850235"/>
+            <a:ext cx="9589008" cy="830997"/>
+          </a:xfrm>
+          <a:prstGeom prst="rect">
+            <a:avLst/>
+          </a:prstGeom>
+          <a:noFill/>
+        </p:spPr>
+        <p:txBody>
+          <a:bodyPr wrap="square" rtlCol="0">
+            <a:spAutoFit/>
+          </a:bodyPr>
+          <a:lstStyle/>
+          <a:p>
+            <a:r>
+              <a:rPr lang="en-US" sz="1200" b="1" u="sng" dirty="0"/>
+              <a:t>The Small Print</a:t>
+            </a:r>
+          </a:p>
+          <a:p>
+            <a:r>
+              <a:rPr lang="en-US" sz="1200" dirty="0"/>
+              <a:t>Definitions of any terms or metrics:  March 2020 to April 2021 | Death Rate is cumulative confirmed Covid Deaths / cumulative confirmed Covid Cases </a:t>
+            </a:r>
+          </a:p>
+          <a:p>
+            <a:r>
+              <a:rPr lang="en-US" sz="1200" dirty="0"/>
+              <a:t>Data Sources: Center for Disease Control (CDC) website: cdc.gov</a:t>
+            </a:r>
+          </a:p>
+          <a:p>
+            <a:r>
+              <a:rPr lang="en-US" sz="1200" dirty="0"/>
+              <a:t>Omissions or filtering: No data for AS</a:t>
+            </a:r>
           </a:p>
         </p:txBody>
       </p:sp>
     </p:spTree>
     <p:extLst>
       <p:ext uri="{BB962C8B-B14F-4D97-AF65-F5344CB8AC3E}">
-        <p14:creationId xmlns:p14="http://schemas.microsoft.com/office/powerpoint/2010/main" val="2572110275"/>
+        <p14:creationId xmlns:p14="http://schemas.microsoft.com/office/powerpoint/2010/main" val="2151935911"/>
       </p:ext>
     </p:extLst>
   </p:cSld>
@@ -3946,7 +4734,7 @@
           <p:cNvPr id="2" name="Title 1">
             <a:extLst>
               <a:ext uri="{FF2B5EF4-FFF2-40B4-BE49-F238E27FC236}">
-                <a16:creationId xmlns:a16="http://schemas.microsoft.com/office/drawing/2014/main" id="{138B9383-E7C7-4DD9-B148-EE11B299E860}"/>
+                <a16:creationId xmlns:a16="http://schemas.microsoft.com/office/drawing/2014/main" id="{AE77BA51-5CA8-47D3-BBDF-9027CDFCCFBB}"/>
               </a:ext>
             </a:extLst>
           </p:cNvPr>
@@ -3963,57 +4751,477 @@
           <a:lstStyle/>
           <a:p>
             <a:r>
-              <a:rPr lang="en-US" dirty="0" err="1"/>
-              <a:t>DataFrames</a:t>
-            </a:r>
+              <a:rPr lang="en-US" dirty="0"/>
+              <a:t>Conclusions [All]</a:t>
+            </a:r>
+          </a:p>
+        </p:txBody>
+      </p:sp>
+      <p:sp>
+        <p:nvSpPr>
+          <p:cNvPr id="3" name="Content Placeholder 2">
+            <a:extLst>
+              <a:ext uri="{FF2B5EF4-FFF2-40B4-BE49-F238E27FC236}">
+                <a16:creationId xmlns:a16="http://schemas.microsoft.com/office/drawing/2014/main" id="{1EF89807-BD61-448C-AECF-F0035C097D51}"/>
+              </a:ext>
+            </a:extLst>
+          </p:cNvPr>
+          <p:cNvSpPr>
+            <a:spLocks noGrp="1"/>
+          </p:cNvSpPr>
+          <p:nvPr>
+            <p:ph idx="1"/>
+          </p:nvPr>
+        </p:nvSpPr>
+        <p:spPr/>
+        <p:txBody>
+          <a:bodyPr/>
+          <a:lstStyle/>
+          <a:p>
             <a:endParaRPr lang="en-US" dirty="0"/>
-          </a:p>
-        </p:txBody>
-      </p:sp>
-      <p:sp>
-        <p:nvSpPr>
-          <p:cNvPr id="3" name="Content Placeholder 2">
-            <a:extLst>
-              <a:ext uri="{FF2B5EF4-FFF2-40B4-BE49-F238E27FC236}">
-                <a16:creationId xmlns:a16="http://schemas.microsoft.com/office/drawing/2014/main" id="{5C2E37D8-100C-44EC-8EF6-2A74500F739A}"/>
-              </a:ext>
-            </a:extLst>
-          </p:cNvPr>
-          <p:cNvSpPr>
-            <a:spLocks noGrp="1"/>
-          </p:cNvSpPr>
-          <p:nvPr>
-            <p:ph idx="1"/>
-          </p:nvPr>
-        </p:nvSpPr>
-        <p:spPr/>
-        <p:txBody>
-          <a:bodyPr/>
-          <a:lstStyle/>
-          <a:p>
-            <a:r>
-              <a:rPr lang="en-US" dirty="0"/>
-              <a:t>Monthly</a:t>
-            </a:r>
-          </a:p>
-          <a:p>
-            <a:r>
-              <a:rPr lang="en-US" dirty="0"/>
-              <a:t>Weekly</a:t>
-            </a:r>
-          </a:p>
-          <a:p>
-            <a:r>
-              <a:rPr lang="en-US" dirty="0"/>
-              <a:t>Not time bound</a:t>
-            </a:r>
           </a:p>
         </p:txBody>
       </p:sp>
     </p:spTree>
     <p:extLst>
       <p:ext uri="{BB962C8B-B14F-4D97-AF65-F5344CB8AC3E}">
-        <p14:creationId xmlns:p14="http://schemas.microsoft.com/office/powerpoint/2010/main" val="1899077523"/>
+        <p14:creationId xmlns:p14="http://schemas.microsoft.com/office/powerpoint/2010/main" val="3665675223"/>
+      </p:ext>
+    </p:extLst>
+  </p:cSld>
+  <p:clrMapOvr>
+    <a:masterClrMapping/>
+  </p:clrMapOvr>
+</p:sld>
+</file>
+
+<file path=ppt/slides/slide7.xml><?xml version="1.0" encoding="utf-8"?>
+<p:sld xmlns:a="http://schemas.openxmlformats.org/drawingml/2006/main" xmlns:r="http://schemas.openxmlformats.org/officeDocument/2006/relationships" xmlns:p="http://schemas.openxmlformats.org/presentationml/2006/main">
+  <p:cSld>
+    <p:spTree>
+      <p:nvGrpSpPr>
+        <p:cNvPr id="1" name=""/>
+        <p:cNvGrpSpPr/>
+        <p:nvPr/>
+      </p:nvGrpSpPr>
+      <p:grpSpPr>
+        <a:xfrm>
+          <a:off x="0" y="0"/>
+          <a:ext cx="0" cy="0"/>
+          <a:chOff x="0" y="0"/>
+          <a:chExt cx="0" cy="0"/>
+        </a:xfrm>
+      </p:grpSpPr>
+      <p:sp>
+        <p:nvSpPr>
+          <p:cNvPr id="2" name="Title 1">
+            <a:extLst>
+              <a:ext uri="{FF2B5EF4-FFF2-40B4-BE49-F238E27FC236}">
+                <a16:creationId xmlns:a16="http://schemas.microsoft.com/office/drawing/2014/main" id="{3F26E01B-F803-4DC7-95D3-9844DB734770}"/>
+              </a:ext>
+            </a:extLst>
+          </p:cNvPr>
+          <p:cNvSpPr>
+            <a:spLocks noGrp="1"/>
+          </p:cNvSpPr>
+          <p:nvPr>
+            <p:ph type="title"/>
+          </p:nvPr>
+        </p:nvSpPr>
+        <p:spPr/>
+        <p:txBody>
+          <a:bodyPr/>
+          <a:lstStyle/>
+          <a:p>
+            <a:r>
+              <a:rPr lang="en-US" dirty="0"/>
+              <a:t>Mitigating / Explanations</a:t>
+            </a:r>
+          </a:p>
+        </p:txBody>
+      </p:sp>
+      <p:sp>
+        <p:nvSpPr>
+          <p:cNvPr id="3" name="Content Placeholder 2">
+            <a:extLst>
+              <a:ext uri="{FF2B5EF4-FFF2-40B4-BE49-F238E27FC236}">
+                <a16:creationId xmlns:a16="http://schemas.microsoft.com/office/drawing/2014/main" id="{B839295A-742B-48D5-BF10-2EEC2FE791B0}"/>
+              </a:ext>
+            </a:extLst>
+          </p:cNvPr>
+          <p:cNvSpPr>
+            <a:spLocks noGrp="1"/>
+          </p:cNvSpPr>
+          <p:nvPr>
+            <p:ph idx="1"/>
+          </p:nvPr>
+        </p:nvSpPr>
+        <p:spPr/>
+        <p:txBody>
+          <a:bodyPr/>
+          <a:lstStyle/>
+          <a:p>
+            <a:r>
+              <a:rPr lang="en-US" dirty="0"/>
+              <a:t>Health</a:t>
+            </a:r>
+          </a:p>
+          <a:p>
+            <a:pPr lvl="1"/>
+            <a:r>
+              <a:rPr lang="en-US" dirty="0"/>
+              <a:t>Quality of health care =&gt; hospital beds per capita</a:t>
+            </a:r>
+          </a:p>
+          <a:p>
+            <a:pPr lvl="1"/>
+            <a:r>
+              <a:rPr lang="en-US" dirty="0"/>
+              <a:t>Scatter plot normalized death rate versus hospital beds</a:t>
+            </a:r>
+          </a:p>
+          <a:p>
+            <a:pPr lvl="1"/>
+            <a:r>
+              <a:rPr lang="en-US" dirty="0"/>
+              <a:t>Regression analysis</a:t>
+            </a:r>
+          </a:p>
+          <a:p>
+            <a:pPr lvl="1"/>
+            <a:endParaRPr lang="en-US" dirty="0"/>
+          </a:p>
+          <a:p>
+            <a:r>
+              <a:rPr lang="en-US" dirty="0"/>
+              <a:t>Preventative Measures</a:t>
+            </a:r>
+          </a:p>
+          <a:p>
+            <a:pPr lvl="1"/>
+            <a:r>
+              <a:rPr lang="en-US" dirty="0"/>
+              <a:t>Mask mandate data (by month)</a:t>
+            </a:r>
+          </a:p>
+          <a:p>
+            <a:pPr lvl="1"/>
+            <a:r>
+              <a:rPr lang="en-US" dirty="0"/>
+              <a:t>Yes or no</a:t>
+            </a:r>
+          </a:p>
+          <a:p>
+            <a:pPr lvl="1"/>
+            <a:r>
+              <a:rPr lang="en-US" dirty="0"/>
+              <a:t>2-sample t-test</a:t>
+            </a:r>
+          </a:p>
+        </p:txBody>
+      </p:sp>
+    </p:spTree>
+    <p:extLst>
+      <p:ext uri="{BB962C8B-B14F-4D97-AF65-F5344CB8AC3E}">
+        <p14:creationId xmlns:p14="http://schemas.microsoft.com/office/powerpoint/2010/main" val="3984935855"/>
+      </p:ext>
+    </p:extLst>
+  </p:cSld>
+  <p:clrMapOvr>
+    <a:masterClrMapping/>
+  </p:clrMapOvr>
+</p:sld>
+</file>
+
+<file path=ppt/slides/slide8.xml><?xml version="1.0" encoding="utf-8"?>
+<p:sld xmlns:a="http://schemas.openxmlformats.org/drawingml/2006/main" xmlns:r="http://schemas.openxmlformats.org/officeDocument/2006/relationships" xmlns:p="http://schemas.openxmlformats.org/presentationml/2006/main">
+  <p:cSld>
+    <p:spTree>
+      <p:nvGrpSpPr>
+        <p:cNvPr id="1" name=""/>
+        <p:cNvGrpSpPr/>
+        <p:nvPr/>
+      </p:nvGrpSpPr>
+      <p:grpSpPr>
+        <a:xfrm>
+          <a:off x="0" y="0"/>
+          <a:ext cx="0" cy="0"/>
+          <a:chOff x="0" y="0"/>
+          <a:chExt cx="0" cy="0"/>
+        </a:xfrm>
+      </p:grpSpPr>
+      <p:sp>
+        <p:nvSpPr>
+          <p:cNvPr id="2" name="Title 1">
+            <a:extLst>
+              <a:ext uri="{FF2B5EF4-FFF2-40B4-BE49-F238E27FC236}">
+                <a16:creationId xmlns:a16="http://schemas.microsoft.com/office/drawing/2014/main" id="{DD2BE12E-2C71-4FC3-A715-6EA7AEBF1F6F}"/>
+              </a:ext>
+            </a:extLst>
+          </p:cNvPr>
+          <p:cNvSpPr>
+            <a:spLocks noGrp="1"/>
+          </p:cNvSpPr>
+          <p:nvPr>
+            <p:ph type="title"/>
+          </p:nvPr>
+        </p:nvSpPr>
+        <p:spPr/>
+        <p:txBody>
+          <a:bodyPr/>
+          <a:lstStyle/>
+          <a:p>
+            <a:r>
+              <a:rPr lang="en-US" dirty="0"/>
+              <a:t>Mitigating / Explanations</a:t>
+            </a:r>
+          </a:p>
+        </p:txBody>
+      </p:sp>
+      <p:sp>
+        <p:nvSpPr>
+          <p:cNvPr id="3" name="Content Placeholder 2">
+            <a:extLst>
+              <a:ext uri="{FF2B5EF4-FFF2-40B4-BE49-F238E27FC236}">
+                <a16:creationId xmlns:a16="http://schemas.microsoft.com/office/drawing/2014/main" id="{7F6B4214-1624-4766-8D3F-611B88207B9D}"/>
+              </a:ext>
+            </a:extLst>
+          </p:cNvPr>
+          <p:cNvSpPr>
+            <a:spLocks noGrp="1"/>
+          </p:cNvSpPr>
+          <p:nvPr>
+            <p:ph idx="1"/>
+          </p:nvPr>
+        </p:nvSpPr>
+        <p:spPr/>
+        <p:txBody>
+          <a:bodyPr/>
+          <a:lstStyle/>
+          <a:p>
+            <a:r>
+              <a:rPr lang="en-US" dirty="0"/>
+              <a:t>Demographics (Scatter Plot – regression)</a:t>
+            </a:r>
+          </a:p>
+          <a:p>
+            <a:pPr lvl="1"/>
+            <a:r>
+              <a:rPr lang="en-US" dirty="0"/>
+              <a:t>Sex</a:t>
+            </a:r>
+          </a:p>
+          <a:p>
+            <a:pPr lvl="1"/>
+            <a:r>
+              <a:rPr lang="en-US" dirty="0"/>
+              <a:t>Race</a:t>
+            </a:r>
+          </a:p>
+          <a:p>
+            <a:pPr lvl="1"/>
+            <a:r>
+              <a:rPr lang="en-US" dirty="0"/>
+              <a:t>Income (if we have time)</a:t>
+            </a:r>
+          </a:p>
+          <a:p>
+            <a:pPr lvl="1"/>
+            <a:endParaRPr lang="en-US" dirty="0"/>
+          </a:p>
+          <a:p>
+            <a:r>
+              <a:rPr lang="en-US" dirty="0"/>
+              <a:t>Timing</a:t>
+            </a:r>
+          </a:p>
+          <a:p>
+            <a:pPr lvl="1"/>
+            <a:r>
+              <a:rPr lang="en-US" dirty="0"/>
+              <a:t>Vaccination roll out</a:t>
+            </a:r>
+          </a:p>
+          <a:p>
+            <a:pPr lvl="1"/>
+            <a:endParaRPr lang="en-US" dirty="0"/>
+          </a:p>
+          <a:p>
+            <a:r>
+              <a:rPr lang="en-US" dirty="0"/>
+              <a:t>Geography</a:t>
+            </a:r>
+          </a:p>
+          <a:p>
+            <a:pPr lvl="1"/>
+            <a:r>
+              <a:rPr lang="en-US" dirty="0"/>
+              <a:t>Urban/Metropolitan populations (if we have time)</a:t>
+            </a:r>
+          </a:p>
+          <a:p>
+            <a:pPr lvl="1"/>
+            <a:endParaRPr lang="en-US" dirty="0"/>
+          </a:p>
+        </p:txBody>
+      </p:sp>
+    </p:spTree>
+    <p:extLst>
+      <p:ext uri="{BB962C8B-B14F-4D97-AF65-F5344CB8AC3E}">
+        <p14:creationId xmlns:p14="http://schemas.microsoft.com/office/powerpoint/2010/main" val="2957254703"/>
+      </p:ext>
+    </p:extLst>
+  </p:cSld>
+  <p:clrMapOvr>
+    <a:masterClrMapping/>
+  </p:clrMapOvr>
+</p:sld>
+</file>
+
+<file path=ppt/slides/slide9.xml><?xml version="1.0" encoding="utf-8"?>
+<p:sld xmlns:a="http://schemas.openxmlformats.org/drawingml/2006/main" xmlns:r="http://schemas.openxmlformats.org/officeDocument/2006/relationships" xmlns:p="http://schemas.openxmlformats.org/presentationml/2006/main">
+  <p:cSld>
+    <p:spTree>
+      <p:nvGrpSpPr>
+        <p:cNvPr id="1" name=""/>
+        <p:cNvGrpSpPr/>
+        <p:nvPr/>
+      </p:nvGrpSpPr>
+      <p:grpSpPr>
+        <a:xfrm>
+          <a:off x="0" y="0"/>
+          <a:ext cx="0" cy="0"/>
+          <a:chOff x="0" y="0"/>
+          <a:chExt cx="0" cy="0"/>
+        </a:xfrm>
+      </p:grpSpPr>
+      <p:sp>
+        <p:nvSpPr>
+          <p:cNvPr id="2" name="Title 1">
+            <a:extLst>
+              <a:ext uri="{FF2B5EF4-FFF2-40B4-BE49-F238E27FC236}">
+                <a16:creationId xmlns:a16="http://schemas.microsoft.com/office/drawing/2014/main" id="{88EEA56A-21EC-4C5D-9474-BFBF3B512795}"/>
+              </a:ext>
+            </a:extLst>
+          </p:cNvPr>
+          <p:cNvSpPr>
+            <a:spLocks noGrp="1"/>
+          </p:cNvSpPr>
+          <p:nvPr>
+            <p:ph type="title"/>
+          </p:nvPr>
+        </p:nvSpPr>
+        <p:spPr/>
+        <p:txBody>
+          <a:bodyPr/>
+          <a:lstStyle/>
+          <a:p>
+            <a:r>
+              <a:rPr lang="en-US" dirty="0"/>
+              <a:t>Health Care : Hospital Beds versus Death Rate</a:t>
+            </a:r>
+            <a:br>
+              <a:rPr lang="en-US" dirty="0"/>
+            </a:br>
+            <a:r>
+              <a:rPr lang="en-US" sz="3200" dirty="0"/>
+              <a:t>High-level conclusion [Mohamed]</a:t>
+            </a:r>
+            <a:endParaRPr lang="en-US" dirty="0"/>
+          </a:p>
+        </p:txBody>
+      </p:sp>
+      <p:sp>
+        <p:nvSpPr>
+          <p:cNvPr id="3" name="Content Placeholder 2">
+            <a:extLst>
+              <a:ext uri="{FF2B5EF4-FFF2-40B4-BE49-F238E27FC236}">
+                <a16:creationId xmlns:a16="http://schemas.microsoft.com/office/drawing/2014/main" id="{8255C409-34C6-40B3-BFB5-F40F2E36F4B8}"/>
+              </a:ext>
+            </a:extLst>
+          </p:cNvPr>
+          <p:cNvSpPr>
+            <a:spLocks noGrp="1"/>
+          </p:cNvSpPr>
+          <p:nvPr>
+            <p:ph idx="1"/>
+          </p:nvPr>
+        </p:nvSpPr>
+        <p:spPr/>
+        <p:txBody>
+          <a:bodyPr/>
+          <a:lstStyle/>
+          <a:p>
+            <a:r>
+              <a:rPr lang="en-US" dirty="0"/>
+              <a:t>Scatter Plot – hospital beds versus death rate (by state)</a:t>
+            </a:r>
+          </a:p>
+          <a:p>
+            <a:r>
+              <a:rPr lang="en-US" dirty="0"/>
+              <a:t>Scatter Plot - regression Analysis</a:t>
+            </a:r>
+          </a:p>
+        </p:txBody>
+      </p:sp>
+      <p:sp>
+        <p:nvSpPr>
+          <p:cNvPr id="4" name="TextBox 3">
+            <a:extLst>
+              <a:ext uri="{FF2B5EF4-FFF2-40B4-BE49-F238E27FC236}">
+                <a16:creationId xmlns:a16="http://schemas.microsoft.com/office/drawing/2014/main" id="{AB8D94A0-A1DF-4026-97E3-EEA0267611A1}"/>
+              </a:ext>
+            </a:extLst>
+          </p:cNvPr>
+          <p:cNvSpPr txBox="1"/>
+          <p:nvPr/>
+        </p:nvSpPr>
+        <p:spPr>
+          <a:xfrm>
+            <a:off x="786384" y="5850235"/>
+            <a:ext cx="9589008" cy="830997"/>
+          </a:xfrm>
+          <a:prstGeom prst="rect">
+            <a:avLst/>
+          </a:prstGeom>
+          <a:noFill/>
+        </p:spPr>
+        <p:txBody>
+          <a:bodyPr wrap="square" rtlCol="0">
+            <a:spAutoFit/>
+          </a:bodyPr>
+          <a:lstStyle/>
+          <a:p>
+            <a:r>
+              <a:rPr lang="en-US" sz="1200" b="1" u="sng" dirty="0"/>
+              <a:t>The Small Print</a:t>
+            </a:r>
+          </a:p>
+          <a:p>
+            <a:r>
+              <a:rPr lang="en-US" sz="1200" dirty="0"/>
+              <a:t>Definitions of any terms or metrics:  March 2020 to April 2021 | Death Rate is cumulative confirmed Covid Deaths / cumulative confirmed Covid Cases </a:t>
+            </a:r>
+          </a:p>
+          <a:p>
+            <a:r>
+              <a:rPr lang="en-US" sz="1200" dirty="0"/>
+              <a:t>Data Sources: Center for Disease Control (CDC) website: cdc.gov</a:t>
+            </a:r>
+          </a:p>
+          <a:p>
+            <a:r>
+              <a:rPr lang="en-US" sz="1200" dirty="0"/>
+              <a:t>Omissions or filtering: No data for AS</a:t>
+            </a:r>
+          </a:p>
+        </p:txBody>
+      </p:sp>
+    </p:spTree>
+    <p:extLst>
+      <p:ext uri="{BB962C8B-B14F-4D97-AF65-F5344CB8AC3E}">
+        <p14:creationId xmlns:p14="http://schemas.microsoft.com/office/powerpoint/2010/main" val="3645529043"/>
       </p:ext>
     </p:extLst>
   </p:cSld>

</xml_diff>

<commit_message>
Excess Deaths and Presentation
</commit_message>
<xml_diff>
--- a/Folder0/Presentation1.pptx
+++ b/Folder0/Presentation1.pptx
@@ -4591,58 +4591,16 @@
           <a:p>
             <a:r>
               <a:rPr lang="en-US" dirty="0"/>
-              <a:t>Excess Deaths [John]</a:t>
+              <a:t>Excess Deaths</a:t>
             </a:r>
             <a:br>
               <a:rPr lang="en-US" dirty="0"/>
             </a:br>
             <a:r>
               <a:rPr lang="en-US" sz="3200" dirty="0"/>
-              <a:t>Q: Are all states reporting consistently?</a:t>
+              <a:t>Are states reporting consistently? Does it affect the death rate?</a:t>
             </a:r>
             <a:endParaRPr lang="en-US" dirty="0"/>
-          </a:p>
-        </p:txBody>
-      </p:sp>
-      <p:sp>
-        <p:nvSpPr>
-          <p:cNvPr id="3" name="Content Placeholder 2">
-            <a:extLst>
-              <a:ext uri="{FF2B5EF4-FFF2-40B4-BE49-F238E27FC236}">
-                <a16:creationId xmlns:a16="http://schemas.microsoft.com/office/drawing/2014/main" id="{8255C409-34C6-40B3-BFB5-F40F2E36F4B8}"/>
-              </a:ext>
-            </a:extLst>
-          </p:cNvPr>
-          <p:cNvSpPr>
-            <a:spLocks noGrp="1"/>
-          </p:cNvSpPr>
-          <p:nvPr>
-            <p:ph idx="1"/>
-          </p:nvPr>
-        </p:nvSpPr>
-        <p:spPr/>
-        <p:txBody>
-          <a:bodyPr/>
-          <a:lstStyle/>
-          <a:p>
-            <a:r>
-              <a:rPr lang="en-US" dirty="0"/>
-              <a:t>Explanation – Covid deaths by Week / Excess Deaths by Week (USA)</a:t>
-            </a:r>
-          </a:p>
-          <a:p>
-            <a:r>
-              <a:rPr lang="en-US" dirty="0"/>
-              <a:t>Max % difference between </a:t>
-            </a:r>
-            <a:r>
-              <a:rPr lang="en-US" dirty="0" err="1"/>
-              <a:t>Coivd</a:t>
-            </a:r>
-            <a:r>
-              <a:rPr lang="en-US" dirty="0"/>
-              <a:t> and Excess Deaths</a:t>
-            </a:r>
           </a:p>
         </p:txBody>
       </p:sp>
@@ -4661,7 +4619,7 @@
         <p:spPr>
           <a:xfrm>
             <a:off x="786384" y="5850235"/>
-            <a:ext cx="9589008" cy="830997"/>
+            <a:ext cx="9589008" cy="1015663"/>
           </a:xfrm>
           <a:prstGeom prst="rect">
             <a:avLst/>
@@ -4682,8 +4640,19 @@
           <a:p>
             <a:r>
               <a:rPr lang="en-US" sz="1200" dirty="0"/>
-              <a:t>Definitions of any terms or metrics:  March 2020 to April 2021 | Death Rate is cumulative confirmed Covid Deaths / cumulative confirmed Covid Cases </a:t>
-            </a:r>
+              <a:t>Definitions of any terms or metrics:  Excess deaths are typically defined as the difference between the observed numbers of deaths in specific time periods and expected numbers of deaths in the same </a:t>
+            </a:r>
+            <a:r>
+              <a:rPr lang="en-US" sz="1200" b="0" i="0" dirty="0">
+                <a:solidFill>
+                  <a:srgbClr val="000000"/>
+                </a:solidFill>
+                <a:effectLst/>
+                <a:latin typeface="Open Sans" panose="020B0604020202020204" pitchFamily="34" charset="0"/>
+              </a:rPr>
+              <a:t>time periods.</a:t>
+            </a:r>
+            <a:endParaRPr lang="en-US" sz="1200" dirty="0"/>
           </a:p>
           <a:p>
             <a:r>
@@ -4694,11 +4663,83 @@
           <a:p>
             <a:r>
               <a:rPr lang="en-US" sz="1200" dirty="0"/>
-              <a:t>Omissions or filtering: No data for AS</a:t>
-            </a:r>
-          </a:p>
-        </p:txBody>
-      </p:sp>
+              <a:t>Omissions or filtering: </a:t>
+            </a:r>
+          </a:p>
+        </p:txBody>
+      </p:sp>
+      <p:pic>
+        <p:nvPicPr>
+          <p:cNvPr id="6" name="Picture 5">
+            <a:extLst>
+              <a:ext uri="{FF2B5EF4-FFF2-40B4-BE49-F238E27FC236}">
+                <a16:creationId xmlns:a16="http://schemas.microsoft.com/office/drawing/2014/main" id="{F2F821FD-AFB1-45B8-98B0-51EDBE3DEE38}"/>
+              </a:ext>
+            </a:extLst>
+          </p:cNvPr>
+          <p:cNvPicPr>
+            <a:picLocks noChangeAspect="1"/>
+          </p:cNvPicPr>
+          <p:nvPr/>
+        </p:nvPicPr>
+        <p:blipFill>
+          <a:blip r:embed="rId2">
+            <a:extLst>
+              <a:ext uri="{28A0092B-C50C-407E-A947-70E740481C1C}">
+                <a14:useLocalDpi xmlns:a14="http://schemas.microsoft.com/office/drawing/2010/main" val="0"/>
+              </a:ext>
+            </a:extLst>
+          </a:blip>
+          <a:stretch>
+            <a:fillRect/>
+          </a:stretch>
+        </p:blipFill>
+        <p:spPr>
+          <a:xfrm>
+            <a:off x="610286" y="1790115"/>
+            <a:ext cx="5485714" cy="3657143"/>
+          </a:xfrm>
+          <a:prstGeom prst="rect">
+            <a:avLst/>
+          </a:prstGeom>
+        </p:spPr>
+      </p:pic>
+      <p:pic>
+        <p:nvPicPr>
+          <p:cNvPr id="12" name="Picture 11">
+            <a:extLst>
+              <a:ext uri="{FF2B5EF4-FFF2-40B4-BE49-F238E27FC236}">
+                <a16:creationId xmlns:a16="http://schemas.microsoft.com/office/drawing/2014/main" id="{DE2B7FC6-BE06-442B-B016-662E7A2F3DCD}"/>
+              </a:ext>
+            </a:extLst>
+          </p:cNvPr>
+          <p:cNvPicPr>
+            <a:picLocks noChangeAspect="1"/>
+          </p:cNvPicPr>
+          <p:nvPr/>
+        </p:nvPicPr>
+        <p:blipFill>
+          <a:blip r:embed="rId3">
+            <a:extLst>
+              <a:ext uri="{28A0092B-C50C-407E-A947-70E740481C1C}">
+                <a14:useLocalDpi xmlns:a14="http://schemas.microsoft.com/office/drawing/2010/main" val="0"/>
+              </a:ext>
+            </a:extLst>
+          </a:blip>
+          <a:stretch>
+            <a:fillRect/>
+          </a:stretch>
+        </p:blipFill>
+        <p:spPr>
+          <a:xfrm>
+            <a:off x="5803379" y="1790115"/>
+            <a:ext cx="5485714" cy="3657143"/>
+          </a:xfrm>
+          <a:prstGeom prst="rect">
+            <a:avLst/>
+          </a:prstGeom>
+        </p:spPr>
+      </p:pic>
     </p:spTree>
     <p:extLst>
       <p:ext uri="{BB962C8B-B14F-4D97-AF65-F5344CB8AC3E}">

</xml_diff>